<commit_message>
Added support for non-mutable fields in support of non-fungible tokens.
</commit_message>
<xml_diff>
--- a/Docs/NEO Persistable Classes Platform 2.1 Overview v0.1-Recording.pptx
+++ b/Docs/NEO Persistable Classes Platform 2.1 Overview v0.1-Recording.pptx
@@ -5,14 +5,16 @@
     <p:sldMasterId id="2147483660" r:id="rId1"/>
   </p:sldMasterIdLst>
   <p:notesMasterIdLst>
-    <p:notesMasterId r:id="rId7"/>
+    <p:notesMasterId r:id="rId9"/>
   </p:notesMasterIdLst>
   <p:sldIdLst>
     <p:sldId id="256" r:id="rId2"/>
     <p:sldId id="259" r:id="rId3"/>
     <p:sldId id="260" r:id="rId4"/>
     <p:sldId id="257" r:id="rId5"/>
-    <p:sldId id="258" r:id="rId6"/>
+    <p:sldId id="262" r:id="rId6"/>
+    <p:sldId id="261" r:id="rId7"/>
+    <p:sldId id="258" r:id="rId8"/>
   </p:sldIdLst>
   <p:sldSz cx="12192000" cy="6858000"/>
   <p:notesSz cx="6858000" cy="9144000"/>
@@ -6304,7 +6306,7 @@
             <a:pPr algn="ctr"/>
             <a:r>
               <a:rPr lang="en-US" dirty="0"/>
-              <a:t>12. NEO Persistable Classes (NPC) Platform 2.1 Overview</a:t>
+              <a:t>12. NEO Persistable Classes (NPC) Platform 2.1: Preview</a:t>
             </a:r>
             <a:endParaRPr lang="en-CA" sz="2400" dirty="0"/>
           </a:p>
@@ -6594,7 +6596,7 @@
           <a:p>
             <a:r>
               <a:rPr lang="en-CA" dirty="0"/>
-              <a:t>Overview</a:t>
+              <a:t>Purpose, Goals, Principles and Drivers</a:t>
             </a:r>
           </a:p>
         </p:txBody>
@@ -6618,7 +6620,7 @@
         <p:spPr>
           <a:xfrm>
             <a:off x="677334" y="1434352"/>
-            <a:ext cx="8596668" cy="5423647"/>
+            <a:ext cx="9244432" cy="5423647"/>
           </a:xfrm>
         </p:spPr>
         <p:txBody>
@@ -6643,7 +6645,21 @@
             <a:pPr lvl="1"/>
             <a:r>
               <a:rPr lang="en-US" dirty="0"/>
-              <a:t>Live demonstration of build C#.NPC smart contract with the NPC Compiler 2.1 </a:t>
+              <a:t>Live demonstration of building a C#.NPC smart contract with NPC Compiler 2.1</a:t>
+            </a:r>
+          </a:p>
+          <a:p>
+            <a:pPr lvl="2"/>
+            <a:r>
+              <a:rPr lang="en-US" dirty="0"/>
+              <a:t>NPC workflows and NPC programming model </a:t>
+            </a:r>
+          </a:p>
+          <a:p>
+            <a:pPr lvl="1"/>
+            <a:r>
+              <a:rPr lang="en-US" dirty="0"/>
+              <a:t>Show the output of the NPC Profiler execution cost analysis (built into the NEO Debugger)</a:t>
             </a:r>
           </a:p>
           <a:p>
@@ -6656,7 +6672,7 @@
             <a:pPr lvl="1"/>
             <a:r>
               <a:rPr lang="en-US" dirty="0"/>
-              <a:t>Level of detail: Awareness</a:t>
+              <a:t>Level of detail: Awareness – not education or training</a:t>
             </a:r>
           </a:p>
           <a:p>
@@ -6822,7 +6838,7 @@
           <a:p>
             <a:r>
               <a:rPr lang="en-CA" dirty="0"/>
-              <a:t>Overview</a:t>
+              <a:t>Audience</a:t>
             </a:r>
           </a:p>
         </p:txBody>
@@ -7515,7 +7531,7 @@
                   <a:srgbClr val="90C226"/>
                 </a:solidFill>
               </a:rPr>
-              <a:t>Overview</a:t>
+              <a:t>Architecture</a:t>
             </a:r>
           </a:p>
         </p:txBody>
@@ -8974,6 +8990,428 @@
           <p:cNvPr id="2" name="Title 1">
             <a:extLst>
               <a:ext uri="{FF2B5EF4-FFF2-40B4-BE49-F238E27FC236}">
+                <a16:creationId xmlns:a16="http://schemas.microsoft.com/office/drawing/2014/main" id="{2FAF7F45-6162-4BF7-BEAD-43296784501D}"/>
+              </a:ext>
+            </a:extLst>
+          </p:cNvPr>
+          <p:cNvSpPr>
+            <a:spLocks noGrp="1"/>
+          </p:cNvSpPr>
+          <p:nvPr>
+            <p:ph type="title"/>
+          </p:nvPr>
+        </p:nvSpPr>
+        <p:spPr/>
+        <p:txBody>
+          <a:bodyPr/>
+          <a:lstStyle/>
+          <a:p>
+            <a:r>
+              <a:rPr lang="en-CA" dirty="0"/>
+              <a:t>Demo</a:t>
+            </a:r>
+          </a:p>
+        </p:txBody>
+      </p:sp>
+      <p:sp>
+        <p:nvSpPr>
+          <p:cNvPr id="3" name="Text Placeholder 2">
+            <a:extLst>
+              <a:ext uri="{FF2B5EF4-FFF2-40B4-BE49-F238E27FC236}">
+                <a16:creationId xmlns:a16="http://schemas.microsoft.com/office/drawing/2014/main" id="{39258C56-766E-4D79-B02B-DDC4C9683434}"/>
+              </a:ext>
+            </a:extLst>
+          </p:cNvPr>
+          <p:cNvSpPr>
+            <a:spLocks noGrp="1"/>
+          </p:cNvSpPr>
+          <p:nvPr>
+            <p:ph type="body" idx="1"/>
+          </p:nvPr>
+        </p:nvSpPr>
+        <p:spPr/>
+        <p:txBody>
+          <a:bodyPr/>
+          <a:lstStyle/>
+          <a:p>
+            <a:r>
+              <a:rPr lang="en-CA" dirty="0"/>
+              <a:t>Meetup Attendee Sign-in Scenario: Smart Contract v0.1</a:t>
+            </a:r>
+          </a:p>
+        </p:txBody>
+      </p:sp>
+      <p:sp>
+        <p:nvSpPr>
+          <p:cNvPr id="4" name="Date Placeholder 3">
+            <a:extLst>
+              <a:ext uri="{FF2B5EF4-FFF2-40B4-BE49-F238E27FC236}">
+                <a16:creationId xmlns:a16="http://schemas.microsoft.com/office/drawing/2014/main" id="{A32AEBF4-ED55-47C2-ABD0-44913CD90624}"/>
+              </a:ext>
+            </a:extLst>
+          </p:cNvPr>
+          <p:cNvSpPr>
+            <a:spLocks noGrp="1"/>
+          </p:cNvSpPr>
+          <p:nvPr>
+            <p:ph type="dt" sz="half" idx="10"/>
+          </p:nvPr>
+        </p:nvSpPr>
+        <p:spPr/>
+        <p:txBody>
+          <a:bodyPr/>
+          <a:lstStyle/>
+          <a:p>
+            <a:fld id="{944B6736-E444-40BC-9804-A945FF01DCA4}" type="datetime1">
+              <a:rPr lang="en-CA" smtClean="0"/>
+              <a:t>2018-03-21</a:t>
+            </a:fld>
+            <a:endParaRPr lang="en-CA" dirty="0"/>
+          </a:p>
+        </p:txBody>
+      </p:sp>
+      <p:sp>
+        <p:nvSpPr>
+          <p:cNvPr id="5" name="Footer Placeholder 4">
+            <a:extLst>
+              <a:ext uri="{FF2B5EF4-FFF2-40B4-BE49-F238E27FC236}">
+                <a16:creationId xmlns:a16="http://schemas.microsoft.com/office/drawing/2014/main" id="{B124D55C-C272-4F25-B4F9-32F6B2ED9AD0}"/>
+              </a:ext>
+            </a:extLst>
+          </p:cNvPr>
+          <p:cNvSpPr>
+            <a:spLocks noGrp="1"/>
+          </p:cNvSpPr>
+          <p:nvPr>
+            <p:ph type="ftr" sz="quarter" idx="11"/>
+          </p:nvPr>
+        </p:nvSpPr>
+        <p:spPr/>
+        <p:txBody>
+          <a:bodyPr/>
+          <a:lstStyle/>
+          <a:p>
+            <a:r>
+              <a:rPr lang="en-CA"/>
+              <a:t>mwherman2000/neo-dotnetquickstart</a:t>
+            </a:r>
+            <a:endParaRPr lang="en-CA" dirty="0"/>
+          </a:p>
+        </p:txBody>
+      </p:sp>
+      <p:sp>
+        <p:nvSpPr>
+          <p:cNvPr id="6" name="Slide Number Placeholder 5">
+            <a:extLst>
+              <a:ext uri="{FF2B5EF4-FFF2-40B4-BE49-F238E27FC236}">
+                <a16:creationId xmlns:a16="http://schemas.microsoft.com/office/drawing/2014/main" id="{48051DC8-A227-435B-B672-2BA47AD7EC44}"/>
+              </a:ext>
+            </a:extLst>
+          </p:cNvPr>
+          <p:cNvSpPr>
+            <a:spLocks noGrp="1"/>
+          </p:cNvSpPr>
+          <p:nvPr>
+            <p:ph type="sldNum" sz="quarter" idx="12"/>
+          </p:nvPr>
+        </p:nvSpPr>
+        <p:spPr/>
+        <p:txBody>
+          <a:bodyPr/>
+          <a:lstStyle/>
+          <a:p>
+            <a:fld id="{7863DA49-5DA7-4C9C-B3D8-BFEC6789B4E0}" type="slidenum">
+              <a:rPr lang="en-CA" smtClean="0"/>
+              <a:t>5</a:t>
+            </a:fld>
+            <a:endParaRPr lang="en-CA" dirty="0"/>
+          </a:p>
+        </p:txBody>
+      </p:sp>
+    </p:spTree>
+    <p:extLst>
+      <p:ext uri="{BB962C8B-B14F-4D97-AF65-F5344CB8AC3E}">
+        <p14:creationId xmlns:p14="http://schemas.microsoft.com/office/powerpoint/2010/main" val="2731209648"/>
+      </p:ext>
+    </p:extLst>
+  </p:cSld>
+  <p:clrMapOvr>
+    <a:masterClrMapping/>
+  </p:clrMapOvr>
+</p:sld>
+</file>
+
+<file path=ppt/slides/slide6.xml><?xml version="1.0" encoding="utf-8"?>
+<p:sld xmlns:a="http://schemas.openxmlformats.org/drawingml/2006/main" xmlns:r="http://schemas.openxmlformats.org/officeDocument/2006/relationships" xmlns:p="http://schemas.openxmlformats.org/presentationml/2006/main">
+  <p:cSld>
+    <p:spTree>
+      <p:nvGrpSpPr>
+        <p:cNvPr id="1" name=""/>
+        <p:cNvGrpSpPr/>
+        <p:nvPr/>
+      </p:nvGrpSpPr>
+      <p:grpSpPr>
+        <a:xfrm>
+          <a:off x="0" y="0"/>
+          <a:ext cx="0" cy="0"/>
+          <a:chOff x="0" y="0"/>
+          <a:chExt cx="0" cy="0"/>
+        </a:xfrm>
+      </p:grpSpPr>
+      <p:sp>
+        <p:nvSpPr>
+          <p:cNvPr id="2" name="Title 1">
+            <a:extLst>
+              <a:ext uri="{FF2B5EF4-FFF2-40B4-BE49-F238E27FC236}">
+                <a16:creationId xmlns:a16="http://schemas.microsoft.com/office/drawing/2014/main" id="{7C8C1967-2752-4859-A7D5-09A6EA5BD49E}"/>
+              </a:ext>
+            </a:extLst>
+          </p:cNvPr>
+          <p:cNvSpPr>
+            <a:spLocks noGrp="1"/>
+          </p:cNvSpPr>
+          <p:nvPr>
+            <p:ph type="title"/>
+          </p:nvPr>
+        </p:nvSpPr>
+        <p:spPr/>
+        <p:txBody>
+          <a:bodyPr/>
+          <a:lstStyle/>
+          <a:p>
+            <a:r>
+              <a:rPr lang="en-CA" dirty="0"/>
+              <a:t>Resources</a:t>
+            </a:r>
+          </a:p>
+        </p:txBody>
+      </p:sp>
+      <p:sp>
+        <p:nvSpPr>
+          <p:cNvPr id="3" name="Content Placeholder 2">
+            <a:extLst>
+              <a:ext uri="{FF2B5EF4-FFF2-40B4-BE49-F238E27FC236}">
+                <a16:creationId xmlns:a16="http://schemas.microsoft.com/office/drawing/2014/main" id="{4C61D799-3E0D-4583-AE03-747B0B30691C}"/>
+              </a:ext>
+            </a:extLst>
+          </p:cNvPr>
+          <p:cNvSpPr>
+            <a:spLocks noGrp="1"/>
+          </p:cNvSpPr>
+          <p:nvPr>
+            <p:ph idx="1"/>
+          </p:nvPr>
+        </p:nvSpPr>
+        <p:spPr>
+          <a:xfrm>
+            <a:off x="677333" y="1434353"/>
+            <a:ext cx="9423107" cy="5423647"/>
+          </a:xfrm>
+        </p:spPr>
+        <p:txBody>
+          <a:bodyPr>
+            <a:normAutofit/>
+          </a:bodyPr>
+          <a:lstStyle/>
+          <a:p>
+            <a:r>
+              <a:rPr lang="en-CA" dirty="0"/>
+              <a:t>Webcasts</a:t>
+            </a:r>
+          </a:p>
+          <a:p>
+            <a:pPr lvl="1"/>
+            <a:r>
+              <a:rPr lang="en-CA" dirty="0"/>
+              <a:t>NEO Persistable Classes (NPC) e-dApp Smart Contract Platform 2.0: Deep Dive (100 minutes)</a:t>
+            </a:r>
+            <a:br>
+              <a:rPr lang="en-CA" dirty="0"/>
+            </a:br>
+            <a:r>
+              <a:rPr lang="en-CA" dirty="0">
+                <a:hlinkClick r:id="rId2"/>
+              </a:rPr>
+              <a:t>https://www.youtube.com/watch?v=Nj4-m2o94VE</a:t>
+            </a:r>
+            <a:r>
+              <a:rPr lang="en-CA" dirty="0"/>
+              <a:t> </a:t>
+            </a:r>
+          </a:p>
+          <a:p>
+            <a:pPr lvl="1"/>
+            <a:r>
+              <a:rPr lang="en-US" dirty="0"/>
+              <a:t>Activity 11. Quick Cycle Edit-Compile-Debugging of C#.NEO Smart Contracts</a:t>
+            </a:r>
+            <a:br>
+              <a:rPr lang="en-US" dirty="0"/>
+            </a:br>
+            <a:r>
+              <a:rPr lang="en-US" dirty="0">
+                <a:hlinkClick r:id="rId3"/>
+              </a:rPr>
+              <a:t>https://www.youtube.com/watch?v=cXBzuuve36Q</a:t>
+            </a:r>
+            <a:r>
+              <a:rPr lang="en-US" dirty="0"/>
+              <a:t> </a:t>
+            </a:r>
+            <a:endParaRPr lang="en-CA" dirty="0"/>
+          </a:p>
+          <a:p>
+            <a:r>
+              <a:rPr lang="en-CA" dirty="0"/>
+              <a:t>Projects</a:t>
+            </a:r>
+          </a:p>
+          <a:p>
+            <a:pPr lvl="1"/>
+            <a:r>
+              <a:rPr lang="en-US" dirty="0"/>
+              <a:t>NEO Blockchain C# Developers Center of Excellence (neo-csharpcoe)</a:t>
+            </a:r>
+            <a:br>
+              <a:rPr lang="en-US" dirty="0"/>
+            </a:br>
+            <a:r>
+              <a:rPr lang="en-US" dirty="0">
+                <a:hlinkClick r:id="rId4"/>
+              </a:rPr>
+              <a:t>https://github.com/mwherman2000/neo-csharpcoe</a:t>
+            </a:r>
+            <a:r>
+              <a:rPr lang="en-US" dirty="0"/>
+              <a:t> </a:t>
+            </a:r>
+          </a:p>
+          <a:p>
+            <a:pPr lvl="1"/>
+            <a:r>
+              <a:rPr lang="en-US" dirty="0"/>
+              <a:t>NEO Blockchain Quick Start Guide for .NET Developers</a:t>
+            </a:r>
+            <a:br>
+              <a:rPr lang="en-US" dirty="0"/>
+            </a:br>
+            <a:r>
+              <a:rPr lang="en-CA" dirty="0">
+                <a:hlinkClick r:id="rId5"/>
+              </a:rPr>
+              <a:t>https://github.com/mwherman2000/neo-dotnetquickstart/blob/master/README.md</a:t>
+            </a:r>
+            <a:r>
+              <a:rPr lang="en-CA" dirty="0"/>
+              <a:t> </a:t>
+            </a:r>
+          </a:p>
+          <a:p>
+            <a:pPr lvl="1"/>
+            <a:r>
+              <a:rPr lang="en-US" dirty="0"/>
+              <a:t>NEO Persistable Classes (NPC) Platform 2.0 - An Efficient Entity-based Platform for enterprise distributed application development using .NET/C#, C#.NEO and the NEO Blockchain </a:t>
+            </a:r>
+            <a:br>
+              <a:rPr lang="en-US" dirty="0"/>
+            </a:br>
+            <a:r>
+              <a:rPr lang="en-CA" dirty="0">
+                <a:hlinkClick r:id="rId6"/>
+              </a:rPr>
+              <a:t>https://github.com/mwherman2000/neo-persistableclasses/blob/master/README.md</a:t>
+            </a:r>
+            <a:r>
+              <a:rPr lang="en-CA" dirty="0"/>
+              <a:t> </a:t>
+            </a:r>
+          </a:p>
+          <a:p>
+            <a:pPr lvl="1"/>
+            <a:r>
+              <a:rPr lang="en-CA" dirty="0"/>
+              <a:t>NEO Persistable Classes (NPC) Compiler 2.1 (npcc) - Compiler for the NEO Persistable Classes (NPC) Platform 2.1</a:t>
+            </a:r>
+            <a:br>
+              <a:rPr lang="en-CA" dirty="0"/>
+            </a:br>
+            <a:r>
+              <a:rPr lang="en-CA" dirty="0">
+                <a:hlinkClick r:id="rId7"/>
+              </a:rPr>
+              <a:t>https://github.com/mwherman2000/neo-npcc2/blob/master/README.md</a:t>
+            </a:r>
+            <a:r>
+              <a:rPr lang="en-CA" dirty="0"/>
+              <a:t> </a:t>
+            </a:r>
+          </a:p>
+        </p:txBody>
+      </p:sp>
+      <p:sp>
+        <p:nvSpPr>
+          <p:cNvPr id="6" name="Slide Number Placeholder 5">
+            <a:extLst>
+              <a:ext uri="{FF2B5EF4-FFF2-40B4-BE49-F238E27FC236}">
+                <a16:creationId xmlns:a16="http://schemas.microsoft.com/office/drawing/2014/main" id="{7B9DAEEB-D62B-4ECA-BBDF-B35785A95EC3}"/>
+              </a:ext>
+            </a:extLst>
+          </p:cNvPr>
+          <p:cNvSpPr>
+            <a:spLocks noGrp="1"/>
+          </p:cNvSpPr>
+          <p:nvPr>
+            <p:ph type="sldNum" sz="quarter" idx="12"/>
+          </p:nvPr>
+        </p:nvSpPr>
+        <p:spPr/>
+        <p:txBody>
+          <a:bodyPr/>
+          <a:lstStyle/>
+          <a:p>
+            <a:fld id="{7863DA49-5DA7-4C9C-B3D8-BFEC6789B4E0}" type="slidenum">
+              <a:rPr lang="en-CA" smtClean="0"/>
+              <a:t>6</a:t>
+            </a:fld>
+            <a:endParaRPr lang="en-CA" dirty="0"/>
+          </a:p>
+        </p:txBody>
+      </p:sp>
+    </p:spTree>
+    <p:extLst>
+      <p:ext uri="{BB962C8B-B14F-4D97-AF65-F5344CB8AC3E}">
+        <p14:creationId xmlns:p14="http://schemas.microsoft.com/office/powerpoint/2010/main" val="3213786155"/>
+      </p:ext>
+    </p:extLst>
+  </p:cSld>
+  <p:clrMapOvr>
+    <a:masterClrMapping/>
+  </p:clrMapOvr>
+</p:sld>
+</file>
+
+<file path=ppt/slides/slide7.xml><?xml version="1.0" encoding="utf-8"?>
+<p:sld xmlns:a="http://schemas.openxmlformats.org/drawingml/2006/main" xmlns:r="http://schemas.openxmlformats.org/officeDocument/2006/relationships" xmlns:p="http://schemas.openxmlformats.org/presentationml/2006/main">
+  <p:cSld>
+    <p:spTree>
+      <p:nvGrpSpPr>
+        <p:cNvPr id="1" name=""/>
+        <p:cNvGrpSpPr/>
+        <p:nvPr/>
+      </p:nvGrpSpPr>
+      <p:grpSpPr>
+        <a:xfrm>
+          <a:off x="0" y="0"/>
+          <a:ext cx="0" cy="0"/>
+          <a:chOff x="0" y="0"/>
+          <a:chExt cx="0" cy="0"/>
+        </a:xfrm>
+      </p:grpSpPr>
+      <p:sp>
+        <p:nvSpPr>
+          <p:cNvPr id="2" name="Title 1">
+            <a:extLst>
+              <a:ext uri="{FF2B5EF4-FFF2-40B4-BE49-F238E27FC236}">
                 <a16:creationId xmlns:a16="http://schemas.microsoft.com/office/drawing/2014/main" id="{0DB63046-A4A7-4BF4-84C5-E263662FAD9C}"/>
               </a:ext>
             </a:extLst>
@@ -9013,10 +9451,49 @@
             <p:ph type="body" idx="1"/>
           </p:nvPr>
         </p:nvSpPr>
-        <p:spPr/>
-        <p:txBody>
-          <a:bodyPr/>
+        <p:spPr>
+          <a:xfrm>
+            <a:off x="677335" y="4527448"/>
+            <a:ext cx="8596668" cy="1513914"/>
+          </a:xfrm>
+        </p:spPr>
+        <p:txBody>
+          <a:bodyPr>
+            <a:normAutofit/>
+          </a:bodyPr>
           <a:lstStyle/>
+          <a:p>
+            <a:r>
+              <a:rPr lang="en-CA" dirty="0"/>
+              <a:t>Discord: </a:t>
+            </a:r>
+            <a:r>
+              <a:rPr lang="en-CA" dirty="0">
+                <a:hlinkClick r:id="rId2"/>
+              </a:rPr>
+              <a:t>https://discord.gg/gqCYeup</a:t>
+            </a:r>
+            <a:r>
+              <a:rPr lang="en-CA" dirty="0"/>
+              <a:t> </a:t>
+            </a:r>
+          </a:p>
+          <a:p>
+            <a:r>
+              <a:rPr lang="en-CA" dirty="0"/>
+              <a:t>LinkedIn: </a:t>
+            </a:r>
+            <a:r>
+              <a:rPr lang="en-CA" dirty="0">
+                <a:hlinkClick r:id="rId3"/>
+              </a:rPr>
+              <a:t>https://www.linkedin.com/in/mwherman/</a:t>
+            </a:r>
+            <a:r>
+              <a:rPr lang="en-CA" dirty="0"/>
+              <a:t> </a:t>
+            </a:r>
+          </a:p>
           <a:p>
             <a:r>
               <a:rPr lang="en-CA" dirty="0"/>
@@ -9048,7 +9525,7 @@
           <a:p>
             <a:fld id="{944B6736-E444-40BC-9804-A945FF01DCA4}" type="datetime1">
               <a:rPr lang="en-CA" smtClean="0"/>
-              <a:t>2018-03-20</a:t>
+              <a:t>2018-03-21</a:t>
             </a:fld>
             <a:endParaRPr lang="en-CA" dirty="0"/>
           </a:p>
@@ -9106,9 +9583,127 @@
           <a:p>
             <a:fld id="{7863DA49-5DA7-4C9C-B3D8-BFEC6789B4E0}" type="slidenum">
               <a:rPr lang="en-CA" smtClean="0"/>
-              <a:t>5</a:t>
+              <a:t>7</a:t>
             </a:fld>
             <a:endParaRPr lang="en-CA" dirty="0"/>
+          </a:p>
+        </p:txBody>
+      </p:sp>
+      <p:pic>
+        <p:nvPicPr>
+          <p:cNvPr id="8" name="Picture 7">
+            <a:extLst>
+              <a:ext uri="{FF2B5EF4-FFF2-40B4-BE49-F238E27FC236}">
+                <a16:creationId xmlns:a16="http://schemas.microsoft.com/office/drawing/2014/main" id="{E4C06180-2F56-46B1-BFEC-E2D01F5A154E}"/>
+              </a:ext>
+            </a:extLst>
+          </p:cNvPr>
+          <p:cNvPicPr>
+            <a:picLocks noChangeAspect="1"/>
+          </p:cNvPicPr>
+          <p:nvPr/>
+        </p:nvPicPr>
+        <p:blipFill>
+          <a:blip r:embed="rId4">
+            <a:extLst>
+              <a:ext uri="{28A0092B-C50C-407E-A947-70E740481C1C}">
+                <a14:useLocalDpi xmlns:a14="http://schemas.microsoft.com/office/drawing/2010/main" val="0"/>
+              </a:ext>
+            </a:extLst>
+          </a:blip>
+          <a:stretch>
+            <a:fillRect/>
+          </a:stretch>
+        </p:blipFill>
+        <p:spPr>
+          <a:xfrm>
+            <a:off x="677335" y="247353"/>
+            <a:ext cx="8937931" cy="3240000"/>
+          </a:xfrm>
+          <a:prstGeom prst="rect">
+            <a:avLst/>
+          </a:prstGeom>
+        </p:spPr>
+      </p:pic>
+      <p:cxnSp>
+        <p:nvCxnSpPr>
+          <p:cNvPr id="10" name="Straight Connector 9">
+            <a:extLst>
+              <a:ext uri="{FF2B5EF4-FFF2-40B4-BE49-F238E27FC236}">
+                <a16:creationId xmlns:a16="http://schemas.microsoft.com/office/drawing/2014/main" id="{D45E2838-02A4-495F-B26A-A887052130B5}"/>
+              </a:ext>
+            </a:extLst>
+          </p:cNvPr>
+          <p:cNvCxnSpPr>
+            <a:cxnSpLocks/>
+          </p:cNvCxnSpPr>
+          <p:nvPr/>
+        </p:nvCxnSpPr>
+        <p:spPr>
+          <a:xfrm>
+            <a:off x="3962403" y="1954929"/>
+            <a:ext cx="2280744" cy="0"/>
+          </a:xfrm>
+          <a:prstGeom prst="line">
+            <a:avLst/>
+          </a:prstGeom>
+          <a:ln w="57150">
+            <a:solidFill>
+              <a:srgbClr val="90C226"/>
+            </a:solidFill>
+          </a:ln>
+        </p:spPr>
+        <p:style>
+          <a:lnRef idx="1">
+            <a:schemeClr val="accent1"/>
+          </a:lnRef>
+          <a:fillRef idx="0">
+            <a:schemeClr val="accent1"/>
+          </a:fillRef>
+          <a:effectRef idx="0">
+            <a:schemeClr val="accent1"/>
+          </a:effectRef>
+          <a:fontRef idx="minor">
+            <a:schemeClr val="tx1"/>
+          </a:fontRef>
+        </p:style>
+      </p:cxnSp>
+      <p:sp>
+        <p:nvSpPr>
+          <p:cNvPr id="12" name="Rectangle 11">
+            <a:extLst>
+              <a:ext uri="{FF2B5EF4-FFF2-40B4-BE49-F238E27FC236}">
+                <a16:creationId xmlns:a16="http://schemas.microsoft.com/office/drawing/2014/main" id="{78C9EEF9-D5D0-4B30-AD65-43A6C76B644A}"/>
+              </a:ext>
+            </a:extLst>
+          </p:cNvPr>
+          <p:cNvSpPr/>
+          <p:nvPr/>
+        </p:nvSpPr>
+        <p:spPr>
+          <a:xfrm>
+            <a:off x="677334" y="3029426"/>
+            <a:ext cx="8937931" cy="369332"/>
+          </a:xfrm>
+          <a:prstGeom prst="rect">
+            <a:avLst/>
+          </a:prstGeom>
+        </p:spPr>
+        <p:txBody>
+          <a:bodyPr wrap="square">
+            <a:spAutoFit/>
+          </a:bodyPr>
+          <a:lstStyle/>
+          <a:p>
+            <a:pPr algn="ctr"/>
+            <a:r>
+              <a:rPr lang="en-CA" dirty="0">
+                <a:solidFill>
+                  <a:schemeClr val="bg1"/>
+                </a:solidFill>
+              </a:rPr>
+              <a:t>https://hyperonomy.com/2018/01/24/tokenization-of-every-little-thing-elt/</a:t>
+            </a:r>
           </a:p>
         </p:txBody>
       </p:sp>

</xml_diff>